<commit_message>
setup sql files and created nav bar for homepage
</commit_message>
<xml_diff>
--- a/plans/snippets.pptx
+++ b/plans/snippets.pptx
@@ -206,7 +206,7 @@
           <a:p>
             <a:fld id="{BFB2A91F-0023-4D2B-8BDF-A4A04BF9B088}" type="datetimeFigureOut">
               <a:rPr lang="en-SG" smtClean="0"/>
-              <a:t>28/3/2022</a:t>
+              <a:t>30/3/2022</a:t>
             </a:fld>
             <a:endParaRPr lang="en-SG"/>
           </a:p>
@@ -800,7 +800,7 @@
           <a:p>
             <a:fld id="{8F0B4F5E-A1FD-4600-BDC8-20F196EC4920}" type="datetimeFigureOut">
               <a:rPr lang="en-SG" smtClean="0"/>
-              <a:t>28/3/2022</a:t>
+              <a:t>30/3/2022</a:t>
             </a:fld>
             <a:endParaRPr lang="en-SG"/>
           </a:p>
@@ -1000,7 +1000,7 @@
           <a:p>
             <a:fld id="{8F0B4F5E-A1FD-4600-BDC8-20F196EC4920}" type="datetimeFigureOut">
               <a:rPr lang="en-SG" smtClean="0"/>
-              <a:t>28/3/2022</a:t>
+              <a:t>30/3/2022</a:t>
             </a:fld>
             <a:endParaRPr lang="en-SG"/>
           </a:p>
@@ -1210,7 +1210,7 @@
           <a:p>
             <a:fld id="{8F0B4F5E-A1FD-4600-BDC8-20F196EC4920}" type="datetimeFigureOut">
               <a:rPr lang="en-SG" smtClean="0"/>
-              <a:t>28/3/2022</a:t>
+              <a:t>30/3/2022</a:t>
             </a:fld>
             <a:endParaRPr lang="en-SG"/>
           </a:p>
@@ -1410,7 +1410,7 @@
           <a:p>
             <a:fld id="{8F0B4F5E-A1FD-4600-BDC8-20F196EC4920}" type="datetimeFigureOut">
               <a:rPr lang="en-SG" smtClean="0"/>
-              <a:t>28/3/2022</a:t>
+              <a:t>30/3/2022</a:t>
             </a:fld>
             <a:endParaRPr lang="en-SG"/>
           </a:p>
@@ -1686,7 +1686,7 @@
           <a:p>
             <a:fld id="{8F0B4F5E-A1FD-4600-BDC8-20F196EC4920}" type="datetimeFigureOut">
               <a:rPr lang="en-SG" smtClean="0"/>
-              <a:t>28/3/2022</a:t>
+              <a:t>30/3/2022</a:t>
             </a:fld>
             <a:endParaRPr lang="en-SG"/>
           </a:p>
@@ -1954,7 +1954,7 @@
           <a:p>
             <a:fld id="{8F0B4F5E-A1FD-4600-BDC8-20F196EC4920}" type="datetimeFigureOut">
               <a:rPr lang="en-SG" smtClean="0"/>
-              <a:t>28/3/2022</a:t>
+              <a:t>30/3/2022</a:t>
             </a:fld>
             <a:endParaRPr lang="en-SG"/>
           </a:p>
@@ -2369,7 +2369,7 @@
           <a:p>
             <a:fld id="{8F0B4F5E-A1FD-4600-BDC8-20F196EC4920}" type="datetimeFigureOut">
               <a:rPr lang="en-SG" smtClean="0"/>
-              <a:t>28/3/2022</a:t>
+              <a:t>30/3/2022</a:t>
             </a:fld>
             <a:endParaRPr lang="en-SG"/>
           </a:p>
@@ -2511,7 +2511,7 @@
           <a:p>
             <a:fld id="{8F0B4F5E-A1FD-4600-BDC8-20F196EC4920}" type="datetimeFigureOut">
               <a:rPr lang="en-SG" smtClean="0"/>
-              <a:t>28/3/2022</a:t>
+              <a:t>30/3/2022</a:t>
             </a:fld>
             <a:endParaRPr lang="en-SG"/>
           </a:p>
@@ -2624,7 +2624,7 @@
           <a:p>
             <a:fld id="{8F0B4F5E-A1FD-4600-BDC8-20F196EC4920}" type="datetimeFigureOut">
               <a:rPr lang="en-SG" smtClean="0"/>
-              <a:t>28/3/2022</a:t>
+              <a:t>30/3/2022</a:t>
             </a:fld>
             <a:endParaRPr lang="en-SG"/>
           </a:p>
@@ -2937,7 +2937,7 @@
           <a:p>
             <a:fld id="{8F0B4F5E-A1FD-4600-BDC8-20F196EC4920}" type="datetimeFigureOut">
               <a:rPr lang="en-SG" smtClean="0"/>
-              <a:t>28/3/2022</a:t>
+              <a:t>30/3/2022</a:t>
             </a:fld>
             <a:endParaRPr lang="en-SG"/>
           </a:p>
@@ -3226,7 +3226,7 @@
           <a:p>
             <a:fld id="{8F0B4F5E-A1FD-4600-BDC8-20F196EC4920}" type="datetimeFigureOut">
               <a:rPr lang="en-SG" smtClean="0"/>
-              <a:t>28/3/2022</a:t>
+              <a:t>30/3/2022</a:t>
             </a:fld>
             <a:endParaRPr lang="en-SG"/>
           </a:p>
@@ -3469,7 +3469,7 @@
           <a:p>
             <a:fld id="{8F0B4F5E-A1FD-4600-BDC8-20F196EC4920}" type="datetimeFigureOut">
               <a:rPr lang="en-SG" smtClean="0"/>
-              <a:t>28/3/2022</a:t>
+              <a:t>30/3/2022</a:t>
             </a:fld>
             <a:endParaRPr lang="en-SG"/>
           </a:p>
@@ -3972,42 +3972,6 @@
           <a:chExt cx="0" cy="0"/>
         </a:xfrm>
       </p:grpSpPr>
-      <p:pic>
-        <p:nvPicPr>
-          <p:cNvPr id="3" name="Picture 2">
-            <a:extLst>
-              <a:ext uri="{FF2B5EF4-FFF2-40B4-BE49-F238E27FC236}">
-                <a16:creationId xmlns:a16="http://schemas.microsoft.com/office/drawing/2014/main" id="{A25F5337-4C44-49A9-A1FC-83843B51F83C}"/>
-              </a:ext>
-            </a:extLst>
-          </p:cNvPr>
-          <p:cNvPicPr>
-            <a:picLocks noChangeAspect="1"/>
-          </p:cNvPicPr>
-          <p:nvPr/>
-        </p:nvPicPr>
-        <p:blipFill>
-          <a:blip r:embed="rId2">
-            <a:extLst>
-              <a:ext uri="{28A0092B-C50C-407E-A947-70E740481C1C}">
-                <a14:useLocalDpi xmlns:a14="http://schemas.microsoft.com/office/drawing/2010/main" val="0"/>
-              </a:ext>
-            </a:extLst>
-          </a:blip>
-          <a:stretch>
-            <a:fillRect/>
-          </a:stretch>
-        </p:blipFill>
-        <p:spPr>
-          <a:xfrm>
-            <a:off x="926647" y="1698092"/>
-            <a:ext cx="3878504" cy="3321311"/>
-          </a:xfrm>
-          <a:prstGeom prst="rect">
-            <a:avLst/>
-          </a:prstGeom>
-        </p:spPr>
-      </p:pic>
       <p:sp>
         <p:nvSpPr>
           <p:cNvPr id="7" name="Title 1">
@@ -4043,10 +4007,10 @@
       </p:sp>
       <p:pic>
         <p:nvPicPr>
-          <p:cNvPr id="8" name="Picture 7">
-            <a:extLst>
-              <a:ext uri="{FF2B5EF4-FFF2-40B4-BE49-F238E27FC236}">
-                <a16:creationId xmlns:a16="http://schemas.microsoft.com/office/drawing/2014/main" id="{8ECC8A59-62DC-47EB-943E-A8EE75E94072}"/>
+          <p:cNvPr id="4" name="Picture 3">
+            <a:extLst>
+              <a:ext uri="{FF2B5EF4-FFF2-40B4-BE49-F238E27FC236}">
+                <a16:creationId xmlns:a16="http://schemas.microsoft.com/office/drawing/2014/main" id="{1AD8D1C5-EA91-4CF0-8DF4-6EAA4E81B2B1}"/>
               </a:ext>
             </a:extLst>
           </p:cNvPr>
@@ -4056,7 +4020,7 @@
           <p:nvPr/>
         </p:nvPicPr>
         <p:blipFill>
-          <a:blip r:embed="rId3">
+          <a:blip r:embed="rId2">
             <a:extLst>
               <a:ext uri="{28A0092B-C50C-407E-A947-70E740481C1C}">
                 <a14:useLocalDpi xmlns:a14="http://schemas.microsoft.com/office/drawing/2010/main" val="0"/>
@@ -4069,15 +4033,48 @@
         </p:blipFill>
         <p:spPr>
           <a:xfrm>
-            <a:off x="5728889" y="2538764"/>
-            <a:ext cx="4791871" cy="1639966"/>
-          </a:xfrm>
-          <a:prstGeom prst="rect">
-            <a:avLst/>
-          </a:prstGeom>
-          <a:solidFill>
-            <a:schemeClr val="bg1"/>
-          </a:solidFill>
+            <a:off x="1178464" y="2606634"/>
+            <a:ext cx="4786908" cy="1644732"/>
+          </a:xfrm>
+          <a:prstGeom prst="rect">
+            <a:avLst/>
+          </a:prstGeom>
+        </p:spPr>
+      </p:pic>
+      <p:pic>
+        <p:nvPicPr>
+          <p:cNvPr id="6" name="Picture 5">
+            <a:extLst>
+              <a:ext uri="{FF2B5EF4-FFF2-40B4-BE49-F238E27FC236}">
+                <a16:creationId xmlns:a16="http://schemas.microsoft.com/office/drawing/2014/main" id="{21AD7A9F-4B8D-42D9-85F5-2021A7E1F42B}"/>
+              </a:ext>
+            </a:extLst>
+          </p:cNvPr>
+          <p:cNvPicPr>
+            <a:picLocks noChangeAspect="1"/>
+          </p:cNvPicPr>
+          <p:nvPr/>
+        </p:nvPicPr>
+        <p:blipFill>
+          <a:blip r:embed="rId3">
+            <a:extLst>
+              <a:ext uri="{28A0092B-C50C-407E-A947-70E740481C1C}">
+                <a14:useLocalDpi xmlns:a14="http://schemas.microsoft.com/office/drawing/2010/main" val="0"/>
+              </a:ext>
+            </a:extLst>
+          </a:blip>
+          <a:stretch>
+            <a:fillRect/>
+          </a:stretch>
+        </p:blipFill>
+        <p:spPr>
+          <a:xfrm>
+            <a:off x="6642321" y="1547808"/>
+            <a:ext cx="3896269" cy="3343742"/>
+          </a:xfrm>
+          <a:prstGeom prst="rect">
+            <a:avLst/>
+          </a:prstGeom>
         </p:spPr>
       </p:pic>
     </p:spTree>

</xml_diff>

<commit_message>
added seed data and updated readme
</commit_message>
<xml_diff>
--- a/plans/snippets.pptx
+++ b/plans/snippets.pptx
@@ -206,7 +206,7 @@
           <a:p>
             <a:fld id="{BFB2A91F-0023-4D2B-8BDF-A4A04BF9B088}" type="datetimeFigureOut">
               <a:rPr lang="en-SG" smtClean="0"/>
-              <a:t>30/3/2022</a:t>
+              <a:t>23/4/2022</a:t>
             </a:fld>
             <a:endParaRPr lang="en-SG"/>
           </a:p>
@@ -800,7 +800,7 @@
           <a:p>
             <a:fld id="{8F0B4F5E-A1FD-4600-BDC8-20F196EC4920}" type="datetimeFigureOut">
               <a:rPr lang="en-SG" smtClean="0"/>
-              <a:t>30/3/2022</a:t>
+              <a:t>23/4/2022</a:t>
             </a:fld>
             <a:endParaRPr lang="en-SG"/>
           </a:p>
@@ -1000,7 +1000,7 @@
           <a:p>
             <a:fld id="{8F0B4F5E-A1FD-4600-BDC8-20F196EC4920}" type="datetimeFigureOut">
               <a:rPr lang="en-SG" smtClean="0"/>
-              <a:t>30/3/2022</a:t>
+              <a:t>23/4/2022</a:t>
             </a:fld>
             <a:endParaRPr lang="en-SG"/>
           </a:p>
@@ -1210,7 +1210,7 @@
           <a:p>
             <a:fld id="{8F0B4F5E-A1FD-4600-BDC8-20F196EC4920}" type="datetimeFigureOut">
               <a:rPr lang="en-SG" smtClean="0"/>
-              <a:t>30/3/2022</a:t>
+              <a:t>23/4/2022</a:t>
             </a:fld>
             <a:endParaRPr lang="en-SG"/>
           </a:p>
@@ -1410,7 +1410,7 @@
           <a:p>
             <a:fld id="{8F0B4F5E-A1FD-4600-BDC8-20F196EC4920}" type="datetimeFigureOut">
               <a:rPr lang="en-SG" smtClean="0"/>
-              <a:t>30/3/2022</a:t>
+              <a:t>23/4/2022</a:t>
             </a:fld>
             <a:endParaRPr lang="en-SG"/>
           </a:p>
@@ -1686,7 +1686,7 @@
           <a:p>
             <a:fld id="{8F0B4F5E-A1FD-4600-BDC8-20F196EC4920}" type="datetimeFigureOut">
               <a:rPr lang="en-SG" smtClean="0"/>
-              <a:t>30/3/2022</a:t>
+              <a:t>23/4/2022</a:t>
             </a:fld>
             <a:endParaRPr lang="en-SG"/>
           </a:p>
@@ -1954,7 +1954,7 @@
           <a:p>
             <a:fld id="{8F0B4F5E-A1FD-4600-BDC8-20F196EC4920}" type="datetimeFigureOut">
               <a:rPr lang="en-SG" smtClean="0"/>
-              <a:t>30/3/2022</a:t>
+              <a:t>23/4/2022</a:t>
             </a:fld>
             <a:endParaRPr lang="en-SG"/>
           </a:p>
@@ -2369,7 +2369,7 @@
           <a:p>
             <a:fld id="{8F0B4F5E-A1FD-4600-BDC8-20F196EC4920}" type="datetimeFigureOut">
               <a:rPr lang="en-SG" smtClean="0"/>
-              <a:t>30/3/2022</a:t>
+              <a:t>23/4/2022</a:t>
             </a:fld>
             <a:endParaRPr lang="en-SG"/>
           </a:p>
@@ -2511,7 +2511,7 @@
           <a:p>
             <a:fld id="{8F0B4F5E-A1FD-4600-BDC8-20F196EC4920}" type="datetimeFigureOut">
               <a:rPr lang="en-SG" smtClean="0"/>
-              <a:t>30/3/2022</a:t>
+              <a:t>23/4/2022</a:t>
             </a:fld>
             <a:endParaRPr lang="en-SG"/>
           </a:p>
@@ -2624,7 +2624,7 @@
           <a:p>
             <a:fld id="{8F0B4F5E-A1FD-4600-BDC8-20F196EC4920}" type="datetimeFigureOut">
               <a:rPr lang="en-SG" smtClean="0"/>
-              <a:t>30/3/2022</a:t>
+              <a:t>23/4/2022</a:t>
             </a:fld>
             <a:endParaRPr lang="en-SG"/>
           </a:p>
@@ -2937,7 +2937,7 @@
           <a:p>
             <a:fld id="{8F0B4F5E-A1FD-4600-BDC8-20F196EC4920}" type="datetimeFigureOut">
               <a:rPr lang="en-SG" smtClean="0"/>
-              <a:t>30/3/2022</a:t>
+              <a:t>23/4/2022</a:t>
             </a:fld>
             <a:endParaRPr lang="en-SG"/>
           </a:p>
@@ -3226,7 +3226,7 @@
           <a:p>
             <a:fld id="{8F0B4F5E-A1FD-4600-BDC8-20F196EC4920}" type="datetimeFigureOut">
               <a:rPr lang="en-SG" smtClean="0"/>
-              <a:t>30/3/2022</a:t>
+              <a:t>23/4/2022</a:t>
             </a:fld>
             <a:endParaRPr lang="en-SG"/>
           </a:p>
@@ -3469,7 +3469,7 @@
           <a:p>
             <a:fld id="{8F0B4F5E-A1FD-4600-BDC8-20F196EC4920}" type="datetimeFigureOut">
               <a:rPr lang="en-SG" smtClean="0"/>
-              <a:t>30/3/2022</a:t>
+              <a:t>23/4/2022</a:t>
             </a:fld>
             <a:endParaRPr lang="en-SG"/>
           </a:p>
@@ -4234,22 +4234,15 @@
           </a:p>
           <a:p>
             <a:r>
-              <a:rPr lang="en-SG" dirty="0"/>
-              <a:t>On each blog, entries can be sorted and viewed </a:t>
-            </a:r>
-            <a:r>
-              <a:rPr lang="en-SG"/>
-              <a:t>by date</a:t>
-            </a:r>
-            <a:endParaRPr lang="en-SG" dirty="0"/>
-          </a:p>
-          <a:p>
-            <a:r>
-              <a:rPr lang="en-SG" dirty="0"/>
-              <a:t>Users allowed to tag their entries with category tags</a:t>
-            </a:r>
-          </a:p>
-          <a:p>
+              <a:rPr lang="en-GB" dirty="0"/>
+              <a:t>Users able to favourite and unfavourite specific entries</a:t>
+            </a:r>
+          </a:p>
+          <a:p>
+            <a:r>
+              <a:rPr lang="en-GB" dirty="0"/>
+              <a:t>Users able to view list of favourite entries</a:t>
+            </a:r>
             <a:endParaRPr lang="en-SG" dirty="0"/>
           </a:p>
           <a:p>
@@ -4417,6 +4410,221 @@
         <p:blipFill rotWithShape="1">
           <a:blip r:embed="rId2">
             <a:extLst>
+              <a:ext uri="{BEBA8EAE-BF5A-486C-A8C5-ECC9F3942E4B}">
+                <a14:imgProps xmlns:a14="http://schemas.microsoft.com/office/drawing/2010/main">
+                  <a14:imgLayer r:embed="rId3">
+                    <a14:imgEffect>
+                      <a14:backgroundRemoval t="3065" b="98851" l="174" r="89121">
+                        <a14:foregroundMark x1="10096" y1="5492" x2="18625" y2="12005"/>
+                        <a14:foregroundMark x1="18625" y1="12005" x2="13838" y2="21839"/>
+                        <a14:foregroundMark x1="13838" y1="21839" x2="23586" y2="13538"/>
+                        <a14:foregroundMark x1="23586" y1="13538" x2="24456" y2="25926"/>
+                        <a14:foregroundMark x1="24456" y1="25926" x2="24456" y2="22605"/>
+                        <a14:foregroundMark x1="30983" y1="6130" x2="20279" y2="9195"/>
+                        <a14:foregroundMark x1="20279" y1="9195" x2="11314" y2="16092"/>
+                        <a14:foregroundMark x1="11314" y1="16092" x2="27154" y2="10983"/>
+                        <a14:foregroundMark x1="27154" y1="10983" x2="7746" y2="15964"/>
+                        <a14:foregroundMark x1="7746" y1="15964" x2="27154" y2="29119"/>
+                        <a14:foregroundMark x1="27154" y1="29119" x2="16449" y2="44317"/>
+                        <a14:foregroundMark x1="16449" y1="44317" x2="18451" y2="63602"/>
+                        <a14:foregroundMark x1="18451" y1="63602" x2="10792" y2="67816"/>
+                        <a14:foregroundMark x1="10792" y1="67816" x2="22106" y2="55045"/>
+                        <a14:foregroundMark x1="22106" y1="55045" x2="23499" y2="74330"/>
+                        <a14:foregroundMark x1="23499" y1="74330" x2="27502" y2="81737"/>
+                        <a14:foregroundMark x1="27502" y1="81737" x2="67537" y2="72542"/>
+                        <a14:foregroundMark x1="67537" y1="72542" x2="59878" y2="77905"/>
+                        <a14:foregroundMark x1="59878" y1="77905" x2="46301" y2="76117"/>
+                        <a14:foregroundMark x1="46301" y1="76117" x2="67363" y2="76756"/>
+                        <a14:foregroundMark x1="67363" y1="76756" x2="65622" y2="75607"/>
+                        <a14:foregroundMark x1="24978" y1="41890" x2="19321" y2="54151"/>
+                        <a14:foregroundMark x1="19321" y1="54151" x2="28982" y2="51852"/>
+                        <a14:foregroundMark x1="28982" y1="51852" x2="23064" y2="52746"/>
+                        <a14:foregroundMark x1="23064" y1="52746" x2="20453" y2="68710"/>
+                        <a14:foregroundMark x1="20453" y1="68710" x2="13664" y2="69987"/>
+                        <a14:foregroundMark x1="13664" y1="69987" x2="12272" y2="77778"/>
+                        <a14:foregroundMark x1="12272" y1="77778" x2="30809" y2="80587"/>
+                        <a14:foregroundMark x1="30809" y1="80587" x2="29330" y2="80332"/>
+                        <a14:foregroundMark x1="52916" y1="80332" x2="65448" y2="82886"/>
+                        <a14:foregroundMark x1="65448" y1="82886" x2="62576" y2="75990"/>
+                        <a14:foregroundMark x1="62576" y1="75990" x2="62054" y2="84036"/>
+                        <a14:foregroundMark x1="62054" y1="84036" x2="73281" y2="89655"/>
+                        <a14:foregroundMark x1="73281" y1="89655" x2="60226" y2="80460"/>
+                        <a14:foregroundMark x1="60226" y1="80460" x2="37076" y2="80077"/>
+                        <a14:foregroundMark x1="37076" y1="80077" x2="47781" y2="85951"/>
+                        <a14:foregroundMark x1="47781" y1="85951" x2="45692" y2="85696"/>
+                        <a14:foregroundMark x1="16623" y1="62708" x2="16362" y2="71648"/>
+                        <a14:foregroundMark x1="16362" y1="71648" x2="19582" y2="63346"/>
+                        <a14:foregroundMark x1="19582" y1="63346" x2="20279" y2="59004"/>
+                        <a14:foregroundMark x1="17493" y1="31673" x2="16275" y2="31290"/>
+                        <a14:foregroundMark x1="10096" y1="11494" x2="4352" y2="17625"/>
+                        <a14:foregroundMark x1="4352" y1="17625" x2="5048" y2="6641"/>
+                        <a14:foregroundMark x1="5048" y1="6641" x2="2959" y2="22222"/>
+                        <a14:foregroundMark x1="2959" y1="22222" x2="8355" y2="93870"/>
+                        <a14:foregroundMark x1="8355" y1="93870" x2="12097" y2="61814"/>
+                        <a14:foregroundMark x1="12097" y1="61814" x2="7659" y2="34994"/>
+                        <a14:foregroundMark x1="7659" y1="34994" x2="7659" y2="34994"/>
+                        <a14:foregroundMark x1="5135" y1="12516" x2="6614" y2="10089"/>
+                        <a14:foregroundMark x1="9835" y1="10089" x2="2872" y2="13665"/>
+                        <a14:foregroundMark x1="9312" y1="9962" x2="2176" y2="15581"/>
+                        <a14:foregroundMark x1="2176" y1="15581" x2="2089" y2="17880"/>
+                        <a14:foregroundMark x1="4178" y1="10600" x2="3307" y2="29885"/>
+                        <a14:foregroundMark x1="4091" y1="9451" x2="1828" y2="17114"/>
+                        <a14:foregroundMark x1="1828" y1="17114" x2="1218" y2="24777"/>
+                        <a14:foregroundMark x1="3481" y1="10600" x2="696" y2="35632"/>
+                        <a14:foregroundMark x1="3307" y1="21456" x2="2350" y2="70115"/>
+                        <a14:foregroundMark x1="4352" y1="94125" x2="13316" y2="93997"/>
+                        <a14:foregroundMark x1="13316" y1="93997" x2="19756" y2="94125"/>
+                        <a14:foregroundMark x1="11053" y1="92976" x2="36554" y2="94764"/>
+                        <a14:foregroundMark x1="3307" y1="96041" x2="15405" y2="98978"/>
+                        <a14:foregroundMark x1="4178" y1="96041" x2="18538" y2="96296"/>
+                        <a14:foregroundMark x1="18538" y1="96296" x2="32811" y2="95019"/>
+                        <a14:foregroundMark x1="32811" y1="95019" x2="33420" y2="95019"/>
+                        <a14:foregroundMark x1="59704" y1="89655" x2="73194" y2="94253"/>
+                        <a14:foregroundMark x1="57789" y1="95913" x2="77459" y2="94508"/>
+                        <a14:foregroundMark x1="43255" y1="63218" x2="41253" y2="77905"/>
+                        <a14:foregroundMark x1="48825" y1="63602" x2="76849" y2="64368"/>
+                        <a14:foregroundMark x1="82158" y1="65006" x2="79547" y2="87229"/>
+                        <a14:foregroundMark x1="35074" y1="32056" x2="36376" y2="41008"/>
+                        <a14:foregroundMark x1="35944" y1="5492" x2="35422" y2="39464"/>
+                        <a14:foregroundMark x1="35683" y1="4598" x2="12707" y2="6386"/>
+                        <a14:foregroundMark x1="18886" y1="3065" x2="23412" y2="3193"/>
+                        <a14:foregroundMark x1="35248" y1="42401" x2="35248" y2="42401"/>
+                        <a14:foregroundMark x1="35161" y1="42912" x2="35161" y2="42912"/>
+                        <a14:foregroundMark x1="35248" y1="42912" x2="35248" y2="42912"/>
+                        <a14:backgroundMark x1="46301" y1="33461" x2="49695" y2="43806"/>
+                        <a14:backgroundMark x1="49695" y1="43806" x2="58399" y2="46616"/>
+                        <a14:backgroundMark x1="58399" y1="46616" x2="67624" y2="38570"/>
+                        <a14:backgroundMark x1="59269" y1="38953" x2="75370" y2="40868"/>
+                        <a14:backgroundMark x1="75370" y1="40868" x2="75196" y2="40613"/>
+                        <a14:backgroundMark x1="83638" y1="40102" x2="69104" y2="44061"/>
+                        <a14:backgroundMark x1="70148" y1="43678" x2="74151" y2="44828"/>
+                        <a14:backgroundMark x1="43690" y1="39847" x2="38816" y2="42912"/>
+                        <a14:backgroundMark x1="38816" y1="42912" x2="42385" y2="45722"/>
+                        <a14:backgroundMark x1="37598" y1="42273" x2="38120" y2="43550"/>
+                        <a14:backgroundMark x1="37424" y1="42784" x2="37337" y2="42912"/>
+                        <a14:backgroundMark x1="37337" y1="43040" x2="35944" y2="42529"/>
+                        <a14:backgroundMark x1="36728" y1="43040" x2="35683" y2="42529"/>
+                        <a14:backgroundMark x1="35770" y1="42401" x2="36466" y2="42784"/>
+                        <a14:backgroundMark x1="36902" y1="42784" x2="36902" y2="42784"/>
+                        <a14:backgroundMark x1="36728" y1="42529" x2="37337" y2="42656"/>
+                        <a14:backgroundMark x1="36815" y1="43167" x2="36815" y2="43167"/>
+                        <a14:backgroundMark x1="37163" y1="43423" x2="37163" y2="43423"/>
+                        <a14:backgroundMark x1="36989" y1="43295" x2="36989" y2="43295"/>
+                        <a14:backgroundMark x1="37076" y1="43423" x2="37076" y2="43423"/>
+                        <a14:backgroundMark x1="51262" y1="53129" x2="51262" y2="53129"/>
+                        <a14:backgroundMark x1="50479" y1="52746" x2="52742" y2="53257"/>
+                        <a14:backgroundMark x1="43342" y1="52746" x2="51697" y2="52235"/>
+                        <a14:backgroundMark x1="51697" y1="52235" x2="52916" y2="52235"/>
+                        <a14:backgroundMark x1="44212" y1="53129" x2="52393" y2="52746"/>
+                        <a14:backgroundMark x1="43255" y1="46743" x2="43255" y2="46743"/>
+                        <a14:backgroundMark x1="43168" y1="47637" x2="43168" y2="47637"/>
+                        <a14:backgroundMark x1="43168" y1="48404" x2="43168" y2="48404"/>
+                        <a14:backgroundMark x1="43168" y1="49170" x2="43168" y2="49170"/>
+                        <a14:backgroundMark x1="43255" y1="49808" x2="43255" y2="49808"/>
+                        <a14:backgroundMark x1="43255" y1="50958" x2="43255" y2="50958"/>
+                        <a14:backgroundMark x1="43255" y1="51724" x2="43255" y2="51724"/>
+                        <a14:backgroundMark x1="53960" y1="52874" x2="53960" y2="52874"/>
+                        <a14:backgroundMark x1="55440" y1="52746" x2="55701" y2="52746"/>
+                        <a14:backgroundMark x1="56919" y1="52746" x2="56919" y2="52746"/>
+                        <a14:backgroundMark x1="58312" y1="52746" x2="58486" y2="52746"/>
+                        <a14:backgroundMark x1="60052" y1="53001" x2="60139" y2="53001"/>
+                        <a14:backgroundMark x1="62054" y1="53001" x2="62054" y2="53001"/>
+                        <a14:backgroundMark x1="64317" y1="53129" x2="64317" y2="53129"/>
+                        <a14:backgroundMark x1="66580" y1="53001" x2="66580" y2="53001"/>
+                        <a14:backgroundMark x1="65622" y1="52874" x2="64926" y2="53129"/>
+                        <a14:backgroundMark x1="63621" y1="53129" x2="63446" y2="53129"/>
+                        <a14:backgroundMark x1="61967" y1="52874" x2="61967" y2="52874"/>
+                        <a14:backgroundMark x1="61010" y1="53384" x2="61010" y2="53384"/>
+                        <a14:backgroundMark x1="59182" y1="53257" x2="59182" y2="53257"/>
+                        <a14:backgroundMark x1="58399" y1="53257" x2="57702" y2="53257"/>
+                        <a14:backgroundMark x1="55614" y1="53129" x2="55614" y2="53129"/>
+                        <a14:backgroundMark x1="54830" y1="53129" x2="54569" y2="53129"/>
+                        <a14:backgroundMark x1="53612" y1="53129" x2="53525" y2="53129"/>
+                        <a14:backgroundMark x1="52654" y1="53129" x2="52654" y2="53129"/>
+                        <a14:backgroundMark x1="53351" y1="53129" x2="53960" y2="53129"/>
+                        <a14:backgroundMark x1="55701" y1="53129" x2="55701" y2="53129"/>
+                        <a14:backgroundMark x1="57441" y1="52874" x2="57615" y2="52874"/>
+                        <a14:backgroundMark x1="59095" y1="52874" x2="59269" y2="52874"/>
+                        <a14:backgroundMark x1="60313" y1="52874" x2="60661" y2="52874"/>
+                        <a14:backgroundMark x1="61706" y1="52874" x2="61880" y2="52874"/>
+                        <a14:backgroundMark x1="63795" y1="53129" x2="64491" y2="53129"/>
+                        <a14:backgroundMark x1="64491" y1="53129" x2="64491" y2="53129"/>
+                        <a14:backgroundMark x1="63272" y1="53512" x2="62837" y2="53512"/>
+                        <a14:backgroundMark x1="62315" y1="53512" x2="62315" y2="53512"/>
+                        <a14:backgroundMark x1="62315" y1="53512" x2="62228" y2="53512"/>
+                        <a14:backgroundMark x1="61793" y1="53384" x2="61619" y2="53384"/>
+                        <a14:backgroundMark x1="58747" y1="53129" x2="58747" y2="53129"/>
+                        <a14:backgroundMark x1="58747" y1="53129" x2="58747" y2="53129"/>
+                        <a14:backgroundMark x1="58747" y1="53129" x2="58747" y2="53129"/>
+                        <a14:backgroundMark x1="56571" y1="53257" x2="56571" y2="53257"/>
+                        <a14:backgroundMark x1="55875" y1="53257" x2="55875" y2="53257"/>
+                        <a14:backgroundMark x1="55614" y1="53257" x2="55614" y2="53257"/>
+                        <a14:backgroundMark x1="55527" y1="53257" x2="55527" y2="53257"/>
+                        <a14:backgroundMark x1="56919" y1="52874" x2="58050" y2="52874"/>
+                        <a14:backgroundMark x1="58573" y1="52746" x2="59269" y2="52874"/>
+                        <a14:backgroundMark x1="60313" y1="53001" x2="60313" y2="53001"/>
+                        <a14:backgroundMark x1="60313" y1="53001" x2="60313" y2="53001"/>
+                        <a14:backgroundMark x1="59008" y1="53129" x2="59008" y2="53129"/>
+                        <a14:backgroundMark x1="59878" y1="53129" x2="60313" y2="53129"/>
+                        <a14:backgroundMark x1="60313" y1="53129" x2="60313" y2="53129"/>
+                        <a14:backgroundMark x1="59704" y1="53001" x2="59530" y2="53001"/>
+                        <a14:backgroundMark x1="54656" y1="53129" x2="54656" y2="53129"/>
+                        <a14:backgroundMark x1="54830" y1="53129" x2="55178" y2="53129"/>
+                        <a14:backgroundMark x1="55352" y1="53129" x2="55352" y2="53129"/>
+                        <a14:backgroundMark x1="55788" y1="53129" x2="56223" y2="53001"/>
+                        <a14:backgroundMark x1="66144" y1="52363" x2="66144" y2="52363"/>
+                        <a14:backgroundMark x1="65535" y1="53001" x2="66406" y2="53129"/>
+                        <a14:backgroundMark x1="66493" y1="53129" x2="66493" y2="53129"/>
+                        <a14:backgroundMark x1="67537" y1="52746" x2="67537" y2="52746"/>
+                        <a14:backgroundMark x1="67450" y1="52618" x2="67450" y2="52618"/>
+                        <a14:backgroundMark x1="67276" y1="52874" x2="67276" y2="52874"/>
+                        <a14:backgroundMark x1="67276" y1="52874" x2="67276" y2="52874"/>
+                        <a14:backgroundMark x1="66841" y1="53001" x2="66841" y2="53001"/>
+                        <a14:backgroundMark x1="75718" y1="52874" x2="75718" y2="52874"/>
+                        <a14:backgroundMark x1="76936" y1="52874" x2="76936" y2="52874"/>
+                        <a14:backgroundMark x1="76066" y1="53129" x2="76501" y2="53129"/>
+                        <a14:backgroundMark x1="77807" y1="53512" x2="78416" y2="53512"/>
+                        <a14:backgroundMark x1="78068" y1="52874" x2="78068" y2="52874"/>
+                        <a14:backgroundMark x1="79286" y1="53129" x2="79286" y2="53129"/>
+                        <a14:backgroundMark x1="80592" y1="53001" x2="80592" y2="53001"/>
+                        <a14:backgroundMark x1="43168" y1="52363" x2="43168" y2="52363"/>
+                        <a14:backgroundMark x1="43081" y1="48404" x2="43081" y2="48404"/>
+                        <a14:backgroundMark x1="43168" y1="47510" x2="43168" y2="47510"/>
+                        <a14:backgroundMark x1="43168" y1="46743" x2="43168" y2="46743"/>
+                        <a14:backgroundMark x1="43255" y1="47126" x2="43255" y2="47126"/>
+                        <a14:backgroundMark x1="43168" y1="47126" x2="43168" y2="47126"/>
+                        <a14:backgroundMark x1="43168" y1="47637" x2="43168" y2="47637"/>
+                        <a14:backgroundMark x1="43081" y1="47893" x2="43081" y2="47893"/>
+                        <a14:backgroundMark x1="43081" y1="48404" x2="43081" y2="48404"/>
+                        <a14:backgroundMark x1="43081" y1="48659" x2="43081" y2="48659"/>
+                        <a14:backgroundMark x1="43081" y1="49042" x2="43081" y2="49042"/>
+                        <a14:backgroundMark x1="43081" y1="49298" x2="43081" y2="49298"/>
+                        <a14:backgroundMark x1="43081" y1="49936" x2="43081" y2="49936"/>
+                        <a14:backgroundMark x1="43081" y1="50192" x2="43081" y2="50192"/>
+                        <a14:backgroundMark x1="43081" y1="50575" x2="43081" y2="50575"/>
+                        <a14:backgroundMark x1="43081" y1="51086" x2="43081" y2="51086"/>
+                        <a14:backgroundMark x1="43081" y1="51341" x2="43081" y2="51341"/>
+                        <a14:backgroundMark x1="43081" y1="51596" x2="43081" y2="51596"/>
+                        <a14:backgroundMark x1="43081" y1="51980" x2="43081" y2="51980"/>
+                        <a14:backgroundMark x1="43081" y1="52235" x2="43081" y2="52235"/>
+                        <a14:backgroundMark x1="43081" y1="52490" x2="43081" y2="52490"/>
+                        <a14:backgroundMark x1="43081" y1="52874" x2="43081" y2="52874"/>
+                        <a14:backgroundMark x1="43168" y1="47637" x2="43168" y2="47637"/>
+                        <a14:backgroundMark x1="43081" y1="47510" x2="43081" y2="47510"/>
+                        <a14:backgroundMark x1="43168" y1="46999" x2="43168" y2="46999"/>
+                        <a14:backgroundMark x1="43081" y1="46616" x2="43081" y2="46616"/>
+                        <a14:backgroundMark x1="43081" y1="46232" x2="43081" y2="46232"/>
+                        <a14:backgroundMark x1="43168" y1="46616" x2="43168" y2="46616"/>
+                        <a14:backgroundMark x1="43168" y1="47126" x2="43168" y2="47126"/>
+                        <a14:backgroundMark x1="43168" y1="47382" x2="43168" y2="47382"/>
+                        <a14:backgroundMark x1="42994" y1="45211" x2="43690" y2="46232"/>
+                        <a14:backgroundMark x1="43081" y1="47126" x2="43081" y2="47126"/>
+                        <a14:backgroundMark x1="43081" y1="47510" x2="43081" y2="47510"/>
+                      </a14:backgroundRemoval>
+                    </a14:imgEffect>
+                  </a14:imgLayer>
+                </a14:imgProps>
+              </a:ext>
               <a:ext uri="{28A0092B-C50C-407E-A947-70E740481C1C}">
                 <a14:useLocalDpi xmlns:a14="http://schemas.microsoft.com/office/drawing/2010/main" val="0"/>
               </a:ext>

</xml_diff>